<commit_message>
Polished the ppt, cleaned the Rmd, added a stargazer use example, and knitted everything.
</commit_message>
<xml_diff>
--- a/MarkdownBBSp2018.pptx
+++ b/MarkdownBBSp2018.pptx
@@ -23,8 +23,9 @@
     <p:sldId id="268" r:id="rId17"/>
     <p:sldId id="269" r:id="rId18"/>
     <p:sldId id="270" r:id="rId19"/>
-    <p:sldId id="271" r:id="rId20"/>
-    <p:sldId id="267" r:id="rId21"/>
+    <p:sldId id="277" r:id="rId20"/>
+    <p:sldId id="271" r:id="rId21"/>
+    <p:sldId id="267" r:id="rId22"/>
   </p:sldIdLst>
   <p:sldSz cx="12192000" cy="6858000"/>
   <p:notesSz cx="6858000" cy="9144000"/>
@@ -6491,7 +6492,7 @@
           <p:cNvPr id="2" name="Title 1">
             <a:extLst>
               <a:ext uri="{FF2B5EF4-FFF2-40B4-BE49-F238E27FC236}">
-                <a16:creationId xmlns:a16="http://schemas.microsoft.com/office/drawing/2014/main" id="{8EEBEC68-DAEA-E74B-9959-02152482A096}"/>
+                <a16:creationId xmlns:a16="http://schemas.microsoft.com/office/drawing/2014/main" id="{C8ECD122-595E-3647-9801-8356C2D9CD49}"/>
               </a:ext>
             </a:extLst>
           </p:cNvPr>
@@ -6509,7 +6510,7 @@
           <a:p>
             <a:r>
               <a:rPr lang="en-US" dirty="0"/>
-              <a:t>How To Learn R Markdown</a:t>
+              <a:t>Other Cool Things About R Markdown</a:t>
             </a:r>
           </a:p>
         </p:txBody>
@@ -6519,7 +6520,7 @@
           <p:cNvPr id="3" name="Content Placeholder 2">
             <a:extLst>
               <a:ext uri="{FF2B5EF4-FFF2-40B4-BE49-F238E27FC236}">
-                <a16:creationId xmlns:a16="http://schemas.microsoft.com/office/drawing/2014/main" id="{BE1729FF-1579-D64D-8FDC-C30779FB3C8E}"/>
+                <a16:creationId xmlns:a16="http://schemas.microsoft.com/office/drawing/2014/main" id="{D443EA61-9095-3144-8D63-CD191153EF15}"/>
               </a:ext>
             </a:extLst>
           </p:cNvPr>
@@ -6530,47 +6531,73 @@
             <p:ph idx="1"/>
           </p:nvPr>
         </p:nvSpPr>
-        <p:spPr/>
-        <p:txBody>
-          <a:bodyPr/>
+        <p:spPr>
+          <a:xfrm>
+            <a:off x="838200" y="1825624"/>
+            <a:ext cx="10515600" cy="4829175"/>
+          </a:xfrm>
+        </p:spPr>
+        <p:txBody>
+          <a:bodyPr>
+            <a:normAutofit lnSpcReduction="10000"/>
+          </a:bodyPr>
           <a:lstStyle/>
           <a:p>
             <a:r>
               <a:rPr lang="en-US" dirty="0"/>
-              <a:t>Go try it! Commit to doing 1 full analysis in it.</a:t>
+              <a:t>Knitting run a fresh R session, increasing reproducibility</a:t>
             </a:r>
           </a:p>
           <a:p>
             <a:r>
               <a:rPr lang="en-US" dirty="0"/>
-              <a:t>Spend about 20 minutes reading one of the excellent intro pages linked at the end of the “Practical R Markdown” document.</a:t>
+              <a:t>R Notebooks are even more responsive than R Markdown pure</a:t>
             </a:r>
           </a:p>
           <a:p>
             <a:r>
               <a:rPr lang="en-US" dirty="0"/>
-              <a:t>When things go wrong:</a:t>
-            </a:r>
-          </a:p>
-          <a:p>
-            <a:pPr lvl="1"/>
+              <a:t>R Presentations can make presentations that are dynamic and flexible, just like R Markdown documents (but learning curve!)</a:t>
+            </a:r>
+          </a:p>
+          <a:p>
             <a:r>
               <a:rPr lang="en-US" dirty="0"/>
-              <a:t>Consult the cheat sheet.</a:t>
-            </a:r>
-          </a:p>
-          <a:p>
-            <a:pPr lvl="1"/>
+              <a:t>It is possible to run other programming languages in code chunks, like Python</a:t>
+            </a:r>
+          </a:p>
+          <a:p>
             <a:r>
               <a:rPr lang="en-US" dirty="0"/>
-              <a:t>Consult an intro page.</a:t>
-            </a:r>
-          </a:p>
-          <a:p>
-            <a:pPr lvl="1"/>
+              <a:t>It is possible to create APA formatted documents (for submission even) with templates</a:t>
+            </a:r>
+          </a:p>
+          <a:p>
             <a:r>
               <a:rPr lang="en-US" dirty="0"/>
-              <a:t>Google the error.</a:t>
+              <a:t>Automatic citation and bibliography generation are possible</a:t>
+            </a:r>
+          </a:p>
+          <a:p>
+            <a:r>
+              <a:rPr lang="en-US" dirty="0"/>
+              <a:t>Works extremely well with version control software (VCS) such as </a:t>
+            </a:r>
+            <a:r>
+              <a:rPr lang="en-US" dirty="0" err="1"/>
+              <a:t>git</a:t>
+            </a:r>
+            <a:r>
+              <a:rPr lang="en-US" dirty="0"/>
+              <a:t> and </a:t>
+            </a:r>
+            <a:r>
+              <a:rPr lang="en-US" dirty="0" err="1"/>
+              <a:t>github</a:t>
+            </a:r>
+            <a:r>
+              <a:rPr lang="en-US" dirty="0"/>
+              <a:t>!</a:t>
             </a:r>
           </a:p>
         </p:txBody>
@@ -6578,7 +6605,7 @@
     </p:spTree>
     <p:extLst>
       <p:ext uri="{BB962C8B-B14F-4D97-AF65-F5344CB8AC3E}">
-        <p14:creationId xmlns:p14="http://schemas.microsoft.com/office/powerpoint/2010/main" val="1557486805"/>
+        <p14:creationId xmlns:p14="http://schemas.microsoft.com/office/powerpoint/2010/main" val="3980256165"/>
       </p:ext>
     </p:extLst>
   </p:cSld>
@@ -6700,6 +6727,140 @@
 </file>
 
 <file path=ppt/slides/slide20.xml><?xml version="1.0" encoding="utf-8"?>
+<p:sld xmlns:a="http://schemas.openxmlformats.org/drawingml/2006/main" xmlns:r="http://schemas.openxmlformats.org/officeDocument/2006/relationships" xmlns:p="http://schemas.openxmlformats.org/presentationml/2006/main">
+  <p:cSld>
+    <p:spTree>
+      <p:nvGrpSpPr>
+        <p:cNvPr id="1" name=""/>
+        <p:cNvGrpSpPr/>
+        <p:nvPr/>
+      </p:nvGrpSpPr>
+      <p:grpSpPr>
+        <a:xfrm>
+          <a:off x="0" y="0"/>
+          <a:ext cx="0" cy="0"/>
+          <a:chOff x="0" y="0"/>
+          <a:chExt cx="0" cy="0"/>
+        </a:xfrm>
+      </p:grpSpPr>
+      <p:sp>
+        <p:nvSpPr>
+          <p:cNvPr id="2" name="Title 1">
+            <a:extLst>
+              <a:ext uri="{FF2B5EF4-FFF2-40B4-BE49-F238E27FC236}">
+                <a16:creationId xmlns:a16="http://schemas.microsoft.com/office/drawing/2014/main" id="{8EEBEC68-DAEA-E74B-9959-02152482A096}"/>
+              </a:ext>
+            </a:extLst>
+          </p:cNvPr>
+          <p:cNvSpPr>
+            <a:spLocks noGrp="1"/>
+          </p:cNvSpPr>
+          <p:nvPr>
+            <p:ph type="title"/>
+          </p:nvPr>
+        </p:nvSpPr>
+        <p:spPr/>
+        <p:txBody>
+          <a:bodyPr/>
+          <a:lstStyle/>
+          <a:p>
+            <a:r>
+              <a:rPr lang="en-US" dirty="0"/>
+              <a:t>How To Learn R Markdown</a:t>
+            </a:r>
+          </a:p>
+        </p:txBody>
+      </p:sp>
+      <p:sp>
+        <p:nvSpPr>
+          <p:cNvPr id="3" name="Content Placeholder 2">
+            <a:extLst>
+              <a:ext uri="{FF2B5EF4-FFF2-40B4-BE49-F238E27FC236}">
+                <a16:creationId xmlns:a16="http://schemas.microsoft.com/office/drawing/2014/main" id="{BE1729FF-1579-D64D-8FDC-C30779FB3C8E}"/>
+              </a:ext>
+            </a:extLst>
+          </p:cNvPr>
+          <p:cNvSpPr>
+            <a:spLocks noGrp="1"/>
+          </p:cNvSpPr>
+          <p:nvPr>
+            <p:ph idx="1"/>
+          </p:nvPr>
+        </p:nvSpPr>
+        <p:spPr/>
+        <p:txBody>
+          <a:bodyPr/>
+          <a:lstStyle/>
+          <a:p>
+            <a:r>
+              <a:rPr lang="en-US" dirty="0"/>
+              <a:t>Go try it! </a:t>
+            </a:r>
+            <a:r>
+              <a:rPr lang="en-US" b="1" dirty="0"/>
+              <a:t>Commit to doing 1 full analysis </a:t>
+            </a:r>
+            <a:r>
+              <a:rPr lang="en-US" dirty="0"/>
+              <a:t>in R Markdown.</a:t>
+            </a:r>
+          </a:p>
+          <a:p>
+            <a:r>
+              <a:rPr lang="en-US" dirty="0"/>
+              <a:t>Spend about 20 minutes reading one of the excellent intro pages linked at the end of the “Practical R Markdown” document.</a:t>
+            </a:r>
+          </a:p>
+          <a:p>
+            <a:r>
+              <a:rPr lang="en-US" dirty="0"/>
+              <a:t>When things go wrong:</a:t>
+            </a:r>
+          </a:p>
+          <a:p>
+            <a:pPr lvl="1"/>
+            <a:r>
+              <a:rPr lang="en-US" dirty="0"/>
+              <a:t>Consult the cheat sheet.</a:t>
+            </a:r>
+          </a:p>
+          <a:p>
+            <a:pPr lvl="1"/>
+            <a:r>
+              <a:rPr lang="en-US" dirty="0"/>
+              <a:t>Consult an intro page.</a:t>
+            </a:r>
+          </a:p>
+          <a:p>
+            <a:pPr lvl="1"/>
+            <a:r>
+              <a:rPr lang="en-US" dirty="0"/>
+              <a:t>Google the error.</a:t>
+            </a:r>
+          </a:p>
+          <a:p>
+            <a:pPr lvl="1"/>
+            <a:r>
+              <a:rPr lang="en-US" dirty="0"/>
+              <a:t>Drop by my office.</a:t>
+            </a:r>
+          </a:p>
+        </p:txBody>
+      </p:sp>
+    </p:spTree>
+    <p:extLst>
+      <p:ext uri="{BB962C8B-B14F-4D97-AF65-F5344CB8AC3E}">
+        <p14:creationId xmlns:p14="http://schemas.microsoft.com/office/powerpoint/2010/main" val="1557486805"/>
+      </p:ext>
+    </p:extLst>
+  </p:cSld>
+  <p:clrMapOvr>
+    <a:masterClrMapping/>
+  </p:clrMapOvr>
+</p:sld>
+</file>
+
+<file path=ppt/slides/slide21.xml><?xml version="1.0" encoding="utf-8"?>
 <p:sld xmlns:a="http://schemas.openxmlformats.org/drawingml/2006/main" xmlns:r="http://schemas.openxmlformats.org/officeDocument/2006/relationships" xmlns:p="http://schemas.openxmlformats.org/presentationml/2006/main">
   <p:cSld>
     <p:spTree>

</xml_diff>

<commit_message>
Added notes on Jupyter.
</commit_message>
<xml_diff>
--- a/MarkdownBBSp2018.pptx
+++ b/MarkdownBBSp2018.pptx
@@ -24,8 +24,9 @@
     <p:sldId id="269" r:id="rId18"/>
     <p:sldId id="270" r:id="rId19"/>
     <p:sldId id="277" r:id="rId20"/>
-    <p:sldId id="271" r:id="rId21"/>
-    <p:sldId id="267" r:id="rId22"/>
+    <p:sldId id="278" r:id="rId21"/>
+    <p:sldId id="271" r:id="rId22"/>
+    <p:sldId id="267" r:id="rId23"/>
   </p:sldIdLst>
   <p:sldSz cx="12192000" cy="6858000"/>
   <p:notesSz cx="6858000" cy="9144000"/>
@@ -290,7 +291,7 @@
           <a:p>
             <a:fld id="{97289C09-30A3-CA4F-88C6-2C2368AC1262}" type="datetimeFigureOut">
               <a:rPr lang="en-US" smtClean="0"/>
-              <a:t>2/6/18</a:t>
+              <a:t>2/7/18</a:t>
             </a:fld>
             <a:endParaRPr lang="en-US"/>
           </a:p>
@@ -488,7 +489,7 @@
           <a:p>
             <a:fld id="{97289C09-30A3-CA4F-88C6-2C2368AC1262}" type="datetimeFigureOut">
               <a:rPr lang="en-US" smtClean="0"/>
-              <a:t>2/6/18</a:t>
+              <a:t>2/7/18</a:t>
             </a:fld>
             <a:endParaRPr lang="en-US"/>
           </a:p>
@@ -696,7 +697,7 @@
           <a:p>
             <a:fld id="{97289C09-30A3-CA4F-88C6-2C2368AC1262}" type="datetimeFigureOut">
               <a:rPr lang="en-US" smtClean="0"/>
-              <a:t>2/6/18</a:t>
+              <a:t>2/7/18</a:t>
             </a:fld>
             <a:endParaRPr lang="en-US"/>
           </a:p>
@@ -894,7 +895,7 @@
           <a:p>
             <a:fld id="{97289C09-30A3-CA4F-88C6-2C2368AC1262}" type="datetimeFigureOut">
               <a:rPr lang="en-US" smtClean="0"/>
-              <a:t>2/6/18</a:t>
+              <a:t>2/7/18</a:t>
             </a:fld>
             <a:endParaRPr lang="en-US"/>
           </a:p>
@@ -1169,7 +1170,7 @@
           <a:p>
             <a:fld id="{97289C09-30A3-CA4F-88C6-2C2368AC1262}" type="datetimeFigureOut">
               <a:rPr lang="en-US" smtClean="0"/>
-              <a:t>2/6/18</a:t>
+              <a:t>2/7/18</a:t>
             </a:fld>
             <a:endParaRPr lang="en-US"/>
           </a:p>
@@ -1434,7 +1435,7 @@
           <a:p>
             <a:fld id="{97289C09-30A3-CA4F-88C6-2C2368AC1262}" type="datetimeFigureOut">
               <a:rPr lang="en-US" smtClean="0"/>
-              <a:t>2/6/18</a:t>
+              <a:t>2/7/18</a:t>
             </a:fld>
             <a:endParaRPr lang="en-US"/>
           </a:p>
@@ -1846,7 +1847,7 @@
           <a:p>
             <a:fld id="{97289C09-30A3-CA4F-88C6-2C2368AC1262}" type="datetimeFigureOut">
               <a:rPr lang="en-US" smtClean="0"/>
-              <a:t>2/6/18</a:t>
+              <a:t>2/7/18</a:t>
             </a:fld>
             <a:endParaRPr lang="en-US"/>
           </a:p>
@@ -1987,7 +1988,7 @@
           <a:p>
             <a:fld id="{97289C09-30A3-CA4F-88C6-2C2368AC1262}" type="datetimeFigureOut">
               <a:rPr lang="en-US" smtClean="0"/>
-              <a:t>2/6/18</a:t>
+              <a:t>2/7/18</a:t>
             </a:fld>
             <a:endParaRPr lang="en-US"/>
           </a:p>
@@ -2100,7 +2101,7 @@
           <a:p>
             <a:fld id="{97289C09-30A3-CA4F-88C6-2C2368AC1262}" type="datetimeFigureOut">
               <a:rPr lang="en-US" smtClean="0"/>
-              <a:t>2/6/18</a:t>
+              <a:t>2/7/18</a:t>
             </a:fld>
             <a:endParaRPr lang="en-US"/>
           </a:p>
@@ -2411,7 +2412,7 @@
           <a:p>
             <a:fld id="{97289C09-30A3-CA4F-88C6-2C2368AC1262}" type="datetimeFigureOut">
               <a:rPr lang="en-US" smtClean="0"/>
-              <a:t>2/6/18</a:t>
+              <a:t>2/7/18</a:t>
             </a:fld>
             <a:endParaRPr lang="en-US"/>
           </a:p>
@@ -2699,7 +2700,7 @@
           <a:p>
             <a:fld id="{97289C09-30A3-CA4F-88C6-2C2368AC1262}" type="datetimeFigureOut">
               <a:rPr lang="en-US" smtClean="0"/>
-              <a:t>2/6/18</a:t>
+              <a:t>2/7/18</a:t>
             </a:fld>
             <a:endParaRPr lang="en-US"/>
           </a:p>
@@ -2940,7 +2941,7 @@
           <a:p>
             <a:fld id="{97289C09-30A3-CA4F-88C6-2C2368AC1262}" type="datetimeFigureOut">
               <a:rPr lang="en-US" smtClean="0"/>
-              <a:t>2/6/18</a:t>
+              <a:t>2/7/18</a:t>
             </a:fld>
             <a:endParaRPr lang="en-US"/>
           </a:p>
@@ -6539,7 +6540,7 @@
         </p:spPr>
         <p:txBody>
           <a:bodyPr>
-            <a:normAutofit lnSpcReduction="10000"/>
+            <a:normAutofit/>
           </a:bodyPr>
           <a:lstStyle/>
           <a:p>
@@ -6570,34 +6571,6 @@
             <a:r>
               <a:rPr lang="en-US" dirty="0"/>
               <a:t>It is possible to create APA formatted documents (for submission even) with templates</a:t>
-            </a:r>
-          </a:p>
-          <a:p>
-            <a:r>
-              <a:rPr lang="en-US" dirty="0"/>
-              <a:t>Automatic citation and bibliography generation are possible</a:t>
-            </a:r>
-          </a:p>
-          <a:p>
-            <a:r>
-              <a:rPr lang="en-US" dirty="0"/>
-              <a:t>Works extremely well with version control software (VCS) such as </a:t>
-            </a:r>
-            <a:r>
-              <a:rPr lang="en-US" dirty="0" err="1"/>
-              <a:t>git</a:t>
-            </a:r>
-            <a:r>
-              <a:rPr lang="en-US" dirty="0"/>
-              <a:t> and </a:t>
-            </a:r>
-            <a:r>
-              <a:rPr lang="en-US" dirty="0" err="1"/>
-              <a:t>github</a:t>
-            </a:r>
-            <a:r>
-              <a:rPr lang="en-US" dirty="0"/>
-              <a:t>!</a:t>
             </a:r>
           </a:p>
         </p:txBody>
@@ -6748,6 +6721,143 @@
           <p:cNvPr id="2" name="Title 1">
             <a:extLst>
               <a:ext uri="{FF2B5EF4-FFF2-40B4-BE49-F238E27FC236}">
+                <a16:creationId xmlns:a16="http://schemas.microsoft.com/office/drawing/2014/main" id="{C8ECD122-595E-3647-9801-8356C2D9CD49}"/>
+              </a:ext>
+            </a:extLst>
+          </p:cNvPr>
+          <p:cNvSpPr>
+            <a:spLocks noGrp="1"/>
+          </p:cNvSpPr>
+          <p:nvPr>
+            <p:ph type="title"/>
+          </p:nvPr>
+        </p:nvSpPr>
+        <p:spPr/>
+        <p:txBody>
+          <a:bodyPr/>
+          <a:lstStyle/>
+          <a:p>
+            <a:r>
+              <a:rPr lang="en-US" dirty="0"/>
+              <a:t>Other Cool Things About R Markdown</a:t>
+            </a:r>
+          </a:p>
+        </p:txBody>
+      </p:sp>
+      <p:sp>
+        <p:nvSpPr>
+          <p:cNvPr id="3" name="Content Placeholder 2">
+            <a:extLst>
+              <a:ext uri="{FF2B5EF4-FFF2-40B4-BE49-F238E27FC236}">
+                <a16:creationId xmlns:a16="http://schemas.microsoft.com/office/drawing/2014/main" id="{D443EA61-9095-3144-8D63-CD191153EF15}"/>
+              </a:ext>
+            </a:extLst>
+          </p:cNvPr>
+          <p:cNvSpPr>
+            <a:spLocks noGrp="1"/>
+          </p:cNvSpPr>
+          <p:nvPr>
+            <p:ph idx="1"/>
+          </p:nvPr>
+        </p:nvSpPr>
+        <p:spPr>
+          <a:xfrm>
+            <a:off x="838200" y="1825624"/>
+            <a:ext cx="10515600" cy="4829175"/>
+          </a:xfrm>
+        </p:spPr>
+        <p:txBody>
+          <a:bodyPr>
+            <a:normAutofit/>
+          </a:bodyPr>
+          <a:lstStyle/>
+          <a:p>
+            <a:r>
+              <a:rPr lang="en-US" dirty="0"/>
+              <a:t>Automatic citation and bibliography generation are possible</a:t>
+            </a:r>
+          </a:p>
+          <a:p>
+            <a:r>
+              <a:rPr lang="en-US" dirty="0"/>
+              <a:t>Works extremely well with version control software (VCS) such as </a:t>
+            </a:r>
+            <a:r>
+              <a:rPr lang="en-US" dirty="0" err="1"/>
+              <a:t>git</a:t>
+            </a:r>
+            <a:r>
+              <a:rPr lang="en-US" dirty="0"/>
+              <a:t> and </a:t>
+            </a:r>
+            <a:r>
+              <a:rPr lang="en-US" dirty="0" err="1"/>
+              <a:t>github</a:t>
+            </a:r>
+            <a:r>
+              <a:rPr lang="en-US" dirty="0"/>
+              <a:t>!</a:t>
+            </a:r>
+          </a:p>
+          <a:p>
+            <a:r>
+              <a:rPr lang="en-US" dirty="0"/>
+              <a:t>There are alternatives for other languages, for example, </a:t>
+            </a:r>
+            <a:r>
+              <a:rPr lang="en-US" dirty="0" err="1"/>
+              <a:t>Jupyter</a:t>
+            </a:r>
+            <a:r>
+              <a:rPr lang="en-US" dirty="0"/>
+              <a:t> (see http://</a:t>
+            </a:r>
+            <a:r>
+              <a:rPr lang="en-US" dirty="0" err="1"/>
+              <a:t>jupyter.org</a:t>
+            </a:r>
+            <a:r>
+              <a:rPr lang="en-US" dirty="0"/>
+              <a:t>/)</a:t>
+            </a:r>
+          </a:p>
+        </p:txBody>
+      </p:sp>
+    </p:spTree>
+    <p:extLst>
+      <p:ext uri="{BB962C8B-B14F-4D97-AF65-F5344CB8AC3E}">
+        <p14:creationId xmlns:p14="http://schemas.microsoft.com/office/powerpoint/2010/main" val="3786598103"/>
+      </p:ext>
+    </p:extLst>
+  </p:cSld>
+  <p:clrMapOvr>
+    <a:masterClrMapping/>
+  </p:clrMapOvr>
+</p:sld>
+</file>
+
+<file path=ppt/slides/slide21.xml><?xml version="1.0" encoding="utf-8"?>
+<p:sld xmlns:a="http://schemas.openxmlformats.org/drawingml/2006/main" xmlns:r="http://schemas.openxmlformats.org/officeDocument/2006/relationships" xmlns:p="http://schemas.openxmlformats.org/presentationml/2006/main">
+  <p:cSld>
+    <p:spTree>
+      <p:nvGrpSpPr>
+        <p:cNvPr id="1" name=""/>
+        <p:cNvGrpSpPr/>
+        <p:nvPr/>
+      </p:nvGrpSpPr>
+      <p:grpSpPr>
+        <a:xfrm>
+          <a:off x="0" y="0"/>
+          <a:ext cx="0" cy="0"/>
+          <a:chOff x="0" y="0"/>
+          <a:chExt cx="0" cy="0"/>
+        </a:xfrm>
+      </p:grpSpPr>
+      <p:sp>
+        <p:nvSpPr>
+          <p:cNvPr id="2" name="Title 1">
+            <a:extLst>
+              <a:ext uri="{FF2B5EF4-FFF2-40B4-BE49-F238E27FC236}">
                 <a16:creationId xmlns:a16="http://schemas.microsoft.com/office/drawing/2014/main" id="{8EEBEC68-DAEA-E74B-9959-02152482A096}"/>
               </a:ext>
             </a:extLst>
@@ -6860,7 +6970,7 @@
 </p:sld>
 </file>
 
-<file path=ppt/slides/slide21.xml><?xml version="1.0" encoding="utf-8"?>
+<file path=ppt/slides/slide22.xml><?xml version="1.0" encoding="utf-8"?>
 <p:sld xmlns:a="http://schemas.openxmlformats.org/drawingml/2006/main" xmlns:r="http://schemas.openxmlformats.org/officeDocument/2006/relationships" xmlns:p="http://schemas.openxmlformats.org/presentationml/2006/main">
   <p:cSld>
     <p:spTree>

</xml_diff>